<commit_message>
Updated User Stories and schedule
</commit_message>
<xml_diff>
--- a/UserStoriesV2.pptx
+++ b/UserStoriesV2.pptx
@@ -254,7 +254,7 @@
           <a:p>
             <a:fld id="{5DDB60B5-0831-44F0-B0BC-66D2EFC82116}" type="datetimeFigureOut">
               <a:rPr lang="en-US" smtClean="0"/>
-              <a:t>2/22/2016</a:t>
+              <a:t>2/29/2016</a:t>
             </a:fld>
             <a:endParaRPr lang="en-US"/>
           </a:p>
@@ -424,7 +424,7 @@
           <a:p>
             <a:fld id="{5DDB60B5-0831-44F0-B0BC-66D2EFC82116}" type="datetimeFigureOut">
               <a:rPr lang="en-US" smtClean="0"/>
-              <a:t>2/22/2016</a:t>
+              <a:t>2/29/2016</a:t>
             </a:fld>
             <a:endParaRPr lang="en-US"/>
           </a:p>
@@ -604,7 +604,7 @@
           <a:p>
             <a:fld id="{5DDB60B5-0831-44F0-B0BC-66D2EFC82116}" type="datetimeFigureOut">
               <a:rPr lang="en-US" smtClean="0"/>
-              <a:t>2/22/2016</a:t>
+              <a:t>2/29/2016</a:t>
             </a:fld>
             <a:endParaRPr lang="en-US"/>
           </a:p>
@@ -774,7 +774,7 @@
           <a:p>
             <a:fld id="{5DDB60B5-0831-44F0-B0BC-66D2EFC82116}" type="datetimeFigureOut">
               <a:rPr lang="en-US" smtClean="0"/>
-              <a:t>2/22/2016</a:t>
+              <a:t>2/29/2016</a:t>
             </a:fld>
             <a:endParaRPr lang="en-US"/>
           </a:p>
@@ -1020,7 +1020,7 @@
           <a:p>
             <a:fld id="{5DDB60B5-0831-44F0-B0BC-66D2EFC82116}" type="datetimeFigureOut">
               <a:rPr lang="en-US" smtClean="0"/>
-              <a:t>2/22/2016</a:t>
+              <a:t>2/29/2016</a:t>
             </a:fld>
             <a:endParaRPr lang="en-US"/>
           </a:p>
@@ -1252,7 +1252,7 @@
           <a:p>
             <a:fld id="{5DDB60B5-0831-44F0-B0BC-66D2EFC82116}" type="datetimeFigureOut">
               <a:rPr lang="en-US" smtClean="0"/>
-              <a:t>2/22/2016</a:t>
+              <a:t>2/29/2016</a:t>
             </a:fld>
             <a:endParaRPr lang="en-US"/>
           </a:p>
@@ -1619,7 +1619,7 @@
           <a:p>
             <a:fld id="{5DDB60B5-0831-44F0-B0BC-66D2EFC82116}" type="datetimeFigureOut">
               <a:rPr lang="en-US" smtClean="0"/>
-              <a:t>2/22/2016</a:t>
+              <a:t>2/29/2016</a:t>
             </a:fld>
             <a:endParaRPr lang="en-US"/>
           </a:p>
@@ -1737,7 +1737,7 @@
           <a:p>
             <a:fld id="{5DDB60B5-0831-44F0-B0BC-66D2EFC82116}" type="datetimeFigureOut">
               <a:rPr lang="en-US" smtClean="0"/>
-              <a:t>2/22/2016</a:t>
+              <a:t>2/29/2016</a:t>
             </a:fld>
             <a:endParaRPr lang="en-US"/>
           </a:p>
@@ -1832,7 +1832,7 @@
           <a:p>
             <a:fld id="{5DDB60B5-0831-44F0-B0BC-66D2EFC82116}" type="datetimeFigureOut">
               <a:rPr lang="en-US" smtClean="0"/>
-              <a:t>2/22/2016</a:t>
+              <a:t>2/29/2016</a:t>
             </a:fld>
             <a:endParaRPr lang="en-US"/>
           </a:p>
@@ -2109,7 +2109,7 @@
           <a:p>
             <a:fld id="{5DDB60B5-0831-44F0-B0BC-66D2EFC82116}" type="datetimeFigureOut">
               <a:rPr lang="en-US" smtClean="0"/>
-              <a:t>2/22/2016</a:t>
+              <a:t>2/29/2016</a:t>
             </a:fld>
             <a:endParaRPr lang="en-US"/>
           </a:p>
@@ -2362,7 +2362,7 @@
           <a:p>
             <a:fld id="{5DDB60B5-0831-44F0-B0BC-66D2EFC82116}" type="datetimeFigureOut">
               <a:rPr lang="en-US" smtClean="0"/>
-              <a:t>2/22/2016</a:t>
+              <a:t>2/29/2016</a:t>
             </a:fld>
             <a:endParaRPr lang="en-US"/>
           </a:p>
@@ -2575,7 +2575,7 @@
           <a:p>
             <a:fld id="{5DDB60B5-0831-44F0-B0BC-66D2EFC82116}" type="datetimeFigureOut">
               <a:rPr lang="en-US" smtClean="0"/>
-              <a:t>2/22/2016</a:t>
+              <a:t>2/29/2016</a:t>
             </a:fld>
             <a:endParaRPr lang="en-US"/>
           </a:p>
@@ -3069,7 +3069,11 @@
           <a:p>
             <a:r>
               <a:rPr lang="en-US" dirty="0"/>
-              <a:t>2/8/16 – 2/22/16</a:t>
+              <a:t>2/8/16 – </a:t>
+            </a:r>
+            <a:r>
+              <a:rPr lang="en-US" dirty="0" smtClean="0"/>
+              <a:t>2/29/16</a:t>
             </a:r>
             <a:endParaRPr lang="en-US" dirty="0"/>
           </a:p>
@@ -3088,7 +3092,7 @@
         <p:spPr/>
         <p:txBody>
           <a:bodyPr>
-            <a:normAutofit lnSpcReduction="10000"/>
+            <a:normAutofit fontScale="92500" lnSpcReduction="10000"/>
           </a:bodyPr>
           <a:lstStyle/>
           <a:p>
@@ -3147,6 +3151,10 @@
             <a:pPr marL="0" indent="0">
               <a:buNone/>
             </a:pPr>
+            <a:r>
+              <a:rPr lang="en-US" dirty="0" smtClean="0"/>
+              <a:t>Note***: We decided that since the sliding menu has profile info, we are going to make this a stretch goal.</a:t>
+            </a:r>
             <a:endParaRPr lang="en-US" dirty="0"/>
           </a:p>
           <a:p>
@@ -3165,8 +3173,13 @@
             </a:r>
             <a:r>
               <a:rPr lang="en-US" dirty="0" smtClean="0"/>
-              <a:t>1 weeks/iterations</a:t>
-            </a:r>
+              <a:t>1 </a:t>
+            </a:r>
+            <a:r>
+              <a:rPr lang="en-US" dirty="0" smtClean="0"/>
+              <a:t>day ~ Stretch goal</a:t>
+            </a:r>
+            <a:endParaRPr lang="en-US" dirty="0" smtClean="0"/>
           </a:p>
           <a:p>
             <a:pPr marL="0" indent="0">
@@ -3174,13 +3187,8 @@
             </a:pPr>
             <a:r>
               <a:rPr lang="en-US" dirty="0"/>
-              <a:t>Priority: </a:t>
-            </a:r>
-            <a:r>
-              <a:rPr lang="en-US" dirty="0"/>
-              <a:t>6</a:t>
-            </a:r>
-            <a:endParaRPr lang="en-US" dirty="0"/>
+              <a:t>Priority: 6</a:t>
+            </a:r>
           </a:p>
           <a:p>
             <a:pPr marL="0" indent="0">
@@ -3237,7 +3245,11 @@
           <a:p>
             <a:r>
               <a:rPr lang="en-US" dirty="0"/>
-              <a:t>2/8/16 – 2/22/16</a:t>
+              <a:t>2/8/16 – </a:t>
+            </a:r>
+            <a:r>
+              <a:rPr lang="en-US" dirty="0" smtClean="0"/>
+              <a:t>2/29/16</a:t>
             </a:r>
             <a:endParaRPr lang="en-US" dirty="0"/>
           </a:p>
@@ -3328,6 +3340,10 @@
             <a:pPr marL="0" indent="0">
               <a:buNone/>
             </a:pPr>
+            <a:r>
+              <a:rPr lang="en-US" dirty="0" smtClean="0"/>
+              <a:t>Note***: We are keeping this as a stretch goal</a:t>
+            </a:r>
             <a:endParaRPr lang="en-US" dirty="0" smtClean="0"/>
           </a:p>
           <a:p>
@@ -3346,13 +3362,8 @@
             </a:r>
             <a:r>
               <a:rPr lang="en-US" dirty="0" smtClean="0"/>
-              <a:t>1 </a:t>
-            </a:r>
-            <a:r>
-              <a:rPr lang="en-US" dirty="0" smtClean="0"/>
-              <a:t>week/iteration ~ Stretch Goal</a:t>
-            </a:r>
-            <a:endParaRPr lang="en-US" dirty="0" smtClean="0"/>
+              <a:t>1 week/iteration ~ Stretch Goal</a:t>
+            </a:r>
           </a:p>
           <a:p>
             <a:pPr marL="0" indent="0">
@@ -3360,13 +3371,8 @@
             </a:pPr>
             <a:r>
               <a:rPr lang="en-US" dirty="0"/>
-              <a:t>Priority: </a:t>
-            </a:r>
-            <a:r>
-              <a:rPr lang="en-US" dirty="0"/>
-              <a:t>7</a:t>
-            </a:r>
-            <a:endParaRPr lang="en-US" dirty="0"/>
+              <a:t>Priority: 7</a:t>
+            </a:r>
           </a:p>
           <a:p>
             <a:pPr marL="0" indent="0">
@@ -3429,7 +3435,11 @@
           <a:p>
             <a:r>
               <a:rPr lang="en-US" dirty="0"/>
-              <a:t>2/16/16 – 2/22/16</a:t>
+              <a:t>2/16/16 – </a:t>
+            </a:r>
+            <a:r>
+              <a:rPr lang="en-US" dirty="0" smtClean="0"/>
+              <a:t>2/29/16</a:t>
             </a:r>
             <a:endParaRPr lang="en-US" dirty="0"/>
           </a:p>
@@ -3517,13 +3527,16 @@
             </a:pPr>
             <a:r>
               <a:rPr lang="en-US" dirty="0"/>
-              <a:t>Est. Time: 2 </a:t>
+              <a:t>Est. Time: </a:t>
+            </a:r>
+            <a:r>
+              <a:rPr lang="en-US" dirty="0" smtClean="0"/>
+              <a:t>1 </a:t>
             </a:r>
             <a:r>
               <a:rPr lang="en-US" dirty="0" smtClean="0"/>
               <a:t>weeks/iterations ~ Stretch Goal</a:t>
             </a:r>
-            <a:endParaRPr lang="en-US" dirty="0" smtClean="0"/>
           </a:p>
           <a:p>
             <a:pPr marL="0" indent="0">
@@ -3531,13 +3544,8 @@
             </a:pPr>
             <a:r>
               <a:rPr lang="en-US" dirty="0"/>
-              <a:t>Priority: </a:t>
-            </a:r>
-            <a:r>
-              <a:rPr lang="en-US" dirty="0"/>
-              <a:t>8</a:t>
-            </a:r>
-            <a:endParaRPr lang="en-US" dirty="0"/>
+              <a:t>Priority: 8</a:t>
+            </a:r>
           </a:p>
           <a:p>
             <a:pPr marL="0" indent="0">
@@ -3603,7 +3611,11 @@
           <a:p>
             <a:r>
               <a:rPr lang="en-US" dirty="0"/>
-              <a:t>2/8/16 – 2/22/16</a:t>
+              <a:t>2/8/16 – </a:t>
+            </a:r>
+            <a:r>
+              <a:rPr lang="en-US" dirty="0" smtClean="0"/>
+              <a:t>2/29/16</a:t>
             </a:r>
             <a:endParaRPr lang="en-US" dirty="0"/>
           </a:p>
@@ -3705,11 +3717,7 @@
             </a:pPr>
             <a:r>
               <a:rPr lang="en-US" dirty="0" smtClean="0"/>
-              <a:t>Priority: </a:t>
-            </a:r>
-            <a:r>
-              <a:rPr lang="en-US" dirty="0" smtClean="0"/>
-              <a:t>DONE</a:t>
+              <a:t>Priority: DONE</a:t>
             </a:r>
             <a:endParaRPr lang="en-US" dirty="0"/>
           </a:p>
@@ -3762,7 +3770,11 @@
           <a:p>
             <a:r>
               <a:rPr lang="en-US" dirty="0"/>
-              <a:t>2/8/16 – 2/22/16</a:t>
+              <a:t>2/8/16 – </a:t>
+            </a:r>
+            <a:r>
+              <a:rPr lang="en-US" dirty="0" smtClean="0"/>
+              <a:t>2/29/16</a:t>
             </a:r>
             <a:endParaRPr lang="en-US" dirty="0"/>
           </a:p>
@@ -3841,13 +3853,8 @@
             </a:pPr>
             <a:r>
               <a:rPr lang="en-US" dirty="0" smtClean="0"/>
-              <a:t>Est. Time: </a:t>
-            </a:r>
-            <a:r>
-              <a:rPr lang="en-US" dirty="0" smtClean="0"/>
-              <a:t>DONE</a:t>
-            </a:r>
-            <a:endParaRPr lang="en-US" dirty="0" smtClean="0"/>
+              <a:t>Est. Time: DONE</a:t>
+            </a:r>
           </a:p>
           <a:p>
             <a:pPr marL="0" indent="0">
@@ -3861,7 +3868,6 @@
               <a:rPr lang="en-US" dirty="0" smtClean="0"/>
               <a:t>DONE</a:t>
             </a:r>
-            <a:endParaRPr lang="en-US" dirty="0" smtClean="0"/>
           </a:p>
           <a:p>
             <a:pPr marL="0" indent="0">
@@ -3918,7 +3924,11 @@
           <a:p>
             <a:r>
               <a:rPr lang="en-US" dirty="0" smtClean="0"/>
-              <a:t>2/8/16 – 2/22/16</a:t>
+              <a:t>2/8/16 – </a:t>
+            </a:r>
+            <a:r>
+              <a:rPr lang="en-US" dirty="0" smtClean="0"/>
+              <a:t>2/29/16</a:t>
             </a:r>
             <a:endParaRPr lang="en-US" dirty="0"/>
           </a:p>
@@ -4008,7 +4018,6 @@
               <a:rPr lang="en-US" dirty="0" smtClean="0"/>
               <a:t>DONE</a:t>
             </a:r>
-            <a:endParaRPr lang="en-US" dirty="0" smtClean="0"/>
           </a:p>
           <a:p>
             <a:pPr marL="0" indent="0">
@@ -4088,7 +4097,11 @@
           <a:p>
             <a:r>
               <a:rPr lang="en-US" dirty="0"/>
-              <a:t>2/8/16 – 2/22/16</a:t>
+              <a:t>2/8/16 – </a:t>
+            </a:r>
+            <a:r>
+              <a:rPr lang="en-US" dirty="0" smtClean="0"/>
+              <a:t>2/29/16</a:t>
             </a:r>
             <a:endParaRPr lang="en-US" dirty="0"/>
           </a:p>
@@ -4171,11 +4184,7 @@
             </a:r>
             <a:r>
               <a:rPr lang="en-US" dirty="0" smtClean="0"/>
-              <a:t>1 </a:t>
-            </a:r>
-            <a:r>
-              <a:rPr lang="en-US" dirty="0" smtClean="0"/>
-              <a:t>weeks/iterations</a:t>
+              <a:t>DONE</a:t>
             </a:r>
             <a:endParaRPr lang="en-US" dirty="0"/>
           </a:p>
@@ -4189,7 +4198,7 @@
             </a:r>
             <a:r>
               <a:rPr lang="en-US" dirty="0" smtClean="0"/>
-              <a:t>1</a:t>
+              <a:t>DONE</a:t>
             </a:r>
             <a:endParaRPr lang="en-US" dirty="0"/>
           </a:p>
@@ -4248,7 +4257,11 @@
           <a:p>
             <a:r>
               <a:rPr lang="en-US" dirty="0"/>
-              <a:t>2/8/16 – 2/22/16</a:t>
+              <a:t>2/8/16 – </a:t>
+            </a:r>
+            <a:r>
+              <a:rPr lang="en-US" dirty="0" smtClean="0"/>
+              <a:t>2/29/16</a:t>
             </a:r>
             <a:endParaRPr lang="en-US" dirty="0"/>
           </a:p>
@@ -4336,13 +4349,8 @@
             </a:pPr>
             <a:r>
               <a:rPr lang="en-US" dirty="0"/>
-              <a:t>Priority: </a:t>
-            </a:r>
-            <a:r>
-              <a:rPr lang="en-US" dirty="0"/>
-              <a:t>2</a:t>
-            </a:r>
-            <a:endParaRPr lang="en-US" dirty="0"/>
+              <a:t>Priority: 2</a:t>
+            </a:r>
           </a:p>
           <a:p>
             <a:pPr marL="0" indent="0">
@@ -4405,7 +4413,11 @@
           <a:p>
             <a:r>
               <a:rPr lang="en-US" dirty="0"/>
-              <a:t>2/8/16 – 2/22/16</a:t>
+              <a:t>2/8/16 – </a:t>
+            </a:r>
+            <a:r>
+              <a:rPr lang="en-US" dirty="0" smtClean="0"/>
+              <a:t>2/29/16</a:t>
             </a:r>
             <a:endParaRPr lang="en-US" dirty="0"/>
           </a:p>
@@ -4500,17 +4512,10 @@
               <a:t>Est. Time: </a:t>
             </a:r>
             <a:r>
-              <a:rPr lang="en-US" dirty="0"/>
-              <a:t>2</a:t>
-            </a:r>
-            <a:r>
-              <a:rPr lang="en-US" dirty="0" smtClean="0"/>
-              <a:t> </a:t>
-            </a:r>
-            <a:r>
-              <a:rPr lang="en-US" dirty="0" smtClean="0"/>
-              <a:t>weeks/iterations</a:t>
-            </a:r>
+              <a:rPr lang="en-US" dirty="0" smtClean="0"/>
+              <a:t>DONE</a:t>
+            </a:r>
+            <a:endParaRPr lang="en-US" dirty="0" smtClean="0"/>
           </a:p>
           <a:p>
             <a:pPr marL="0" indent="0">
@@ -4522,7 +4527,7 @@
             </a:r>
             <a:r>
               <a:rPr lang="en-US" dirty="0" smtClean="0"/>
-              <a:t>3</a:t>
+              <a:t>DONE</a:t>
             </a:r>
             <a:endParaRPr lang="en-US" dirty="0"/>
           </a:p>
@@ -4581,7 +4586,11 @@
           <a:p>
             <a:r>
               <a:rPr lang="en-US" dirty="0"/>
-              <a:t>2/8/16 – 2/22/16</a:t>
+              <a:t>2/8/16 – </a:t>
+            </a:r>
+            <a:r>
+              <a:rPr lang="en-US" dirty="0" smtClean="0"/>
+              <a:t>2/29/16</a:t>
             </a:r>
             <a:endParaRPr lang="en-US" dirty="0"/>
           </a:p>
@@ -4618,27 +4627,28 @@
             </a:pPr>
             <a:r>
               <a:rPr lang="en-US" dirty="0" smtClean="0"/>
-              <a:t>I want … to be able to </a:t>
-            </a:r>
-            <a:r>
-              <a:rPr lang="en-US" dirty="0" smtClean="0"/>
-              <a:t>see the phone number for the owner of that post</a:t>
-            </a:r>
+              <a:t>I want … to be able to see the phone number for the owner of that post</a:t>
+            </a:r>
+          </a:p>
+          <a:p>
+            <a:pPr marL="0" indent="0">
+              <a:buNone/>
+            </a:pPr>
+            <a:r>
+              <a:rPr lang="en-US" dirty="0" smtClean="0"/>
+              <a:t>So that … I can coordinate the transaction.</a:t>
+            </a:r>
+          </a:p>
+          <a:p>
+            <a:pPr marL="0" indent="0">
+              <a:buNone/>
+            </a:pPr>
             <a:endParaRPr lang="en-US" dirty="0" smtClean="0"/>
           </a:p>
           <a:p>
             <a:pPr marL="0" indent="0">
               <a:buNone/>
             </a:pPr>
-            <a:r>
-              <a:rPr lang="en-US" dirty="0" smtClean="0"/>
-              <a:t>So that … I can coordinate the transaction.</a:t>
-            </a:r>
-          </a:p>
-          <a:p>
-            <a:pPr marL="0" indent="0">
-              <a:buNone/>
-            </a:pPr>
             <a:endParaRPr lang="en-US" dirty="0" smtClean="0"/>
           </a:p>
           <a:p>
@@ -4657,21 +4667,10 @@
             <a:pPr marL="0" indent="0">
               <a:buNone/>
             </a:pPr>
-            <a:endParaRPr lang="en-US" dirty="0" smtClean="0"/>
-          </a:p>
-          <a:p>
-            <a:pPr marL="0" indent="0">
-              <a:buNone/>
-            </a:pPr>
-            <a:r>
-              <a:rPr lang="en-US" dirty="0" smtClean="0"/>
-              <a:t>Est. Time: </a:t>
-            </a:r>
-            <a:r>
-              <a:rPr lang="en-US" dirty="0" smtClean="0"/>
-              <a:t>1 day</a:t>
-            </a:r>
-            <a:endParaRPr lang="en-US" dirty="0" smtClean="0"/>
+            <a:r>
+              <a:rPr lang="en-US" dirty="0" smtClean="0"/>
+              <a:t>Est. Time: 1 day</a:t>
+            </a:r>
           </a:p>
           <a:p>
             <a:pPr marL="0" indent="0">
@@ -4748,7 +4747,11 @@
           <a:p>
             <a:r>
               <a:rPr lang="en-US" dirty="0"/>
-              <a:t>2/8/16 – 2/22/16</a:t>
+              <a:t>2/8/16 – </a:t>
+            </a:r>
+            <a:r>
+              <a:rPr lang="en-US" dirty="0" smtClean="0"/>
+              <a:t>2/29/16</a:t>
             </a:r>
             <a:endParaRPr lang="en-US" dirty="0"/>
           </a:p>
@@ -4829,6 +4832,10 @@
             <a:pPr marL="0" indent="0">
               <a:buNone/>
             </a:pPr>
+            <a:r>
+              <a:rPr lang="en-US" dirty="0" smtClean="0"/>
+              <a:t>(Almost done)</a:t>
+            </a:r>
             <a:endParaRPr lang="en-US" dirty="0"/>
           </a:p>
           <a:p>
@@ -4841,17 +4848,25 @@
             </a:r>
             <a:r>
               <a:rPr lang="en-US" dirty="0" smtClean="0"/>
-              <a:t>1 weeks/iterations ~ stretch goal</a:t>
-            </a:r>
-            <a:endParaRPr lang="en-US" dirty="0" smtClean="0"/>
-          </a:p>
-          <a:p>
-            <a:pPr marL="0" indent="0">
-              <a:buNone/>
-            </a:pPr>
+              <a:t>1 </a:t>
+            </a:r>
+            <a:r>
+              <a:rPr lang="en-US" dirty="0" smtClean="0"/>
+              <a:t>week</a:t>
+            </a:r>
+            <a:endParaRPr lang="en-US" dirty="0"/>
+          </a:p>
+          <a:p>
+            <a:pPr marL="0" indent="0">
+              <a:buNone/>
+            </a:pPr>
+            <a:r>
+              <a:rPr lang="en-US" dirty="0" smtClean="0"/>
+              <a:t>Priority</a:t>
+            </a:r>
             <a:r>
               <a:rPr lang="en-US" dirty="0"/>
-              <a:t>Priority: </a:t>
+              <a:t>: </a:t>
             </a:r>
             <a:r>
               <a:rPr lang="en-US" dirty="0" smtClean="0"/>

</xml_diff>

<commit_message>
Updated scedule and user stories
</commit_message>
<xml_diff>
--- a/UserStoriesV2.pptx
+++ b/UserStoriesV2.pptx
@@ -254,7 +254,7 @@
           <a:p>
             <a:fld id="{5DDB60B5-0831-44F0-B0BC-66D2EFC82116}" type="datetimeFigureOut">
               <a:rPr lang="en-US" smtClean="0"/>
-              <a:t>2/29/2016</a:t>
+              <a:t>3/8/2016</a:t>
             </a:fld>
             <a:endParaRPr lang="en-US"/>
           </a:p>
@@ -424,7 +424,7 @@
           <a:p>
             <a:fld id="{5DDB60B5-0831-44F0-B0BC-66D2EFC82116}" type="datetimeFigureOut">
               <a:rPr lang="en-US" smtClean="0"/>
-              <a:t>2/29/2016</a:t>
+              <a:t>3/8/2016</a:t>
             </a:fld>
             <a:endParaRPr lang="en-US"/>
           </a:p>
@@ -604,7 +604,7 @@
           <a:p>
             <a:fld id="{5DDB60B5-0831-44F0-B0BC-66D2EFC82116}" type="datetimeFigureOut">
               <a:rPr lang="en-US" smtClean="0"/>
-              <a:t>2/29/2016</a:t>
+              <a:t>3/8/2016</a:t>
             </a:fld>
             <a:endParaRPr lang="en-US"/>
           </a:p>
@@ -774,7 +774,7 @@
           <a:p>
             <a:fld id="{5DDB60B5-0831-44F0-B0BC-66D2EFC82116}" type="datetimeFigureOut">
               <a:rPr lang="en-US" smtClean="0"/>
-              <a:t>2/29/2016</a:t>
+              <a:t>3/8/2016</a:t>
             </a:fld>
             <a:endParaRPr lang="en-US"/>
           </a:p>
@@ -1020,7 +1020,7 @@
           <a:p>
             <a:fld id="{5DDB60B5-0831-44F0-B0BC-66D2EFC82116}" type="datetimeFigureOut">
               <a:rPr lang="en-US" smtClean="0"/>
-              <a:t>2/29/2016</a:t>
+              <a:t>3/8/2016</a:t>
             </a:fld>
             <a:endParaRPr lang="en-US"/>
           </a:p>
@@ -1252,7 +1252,7 @@
           <a:p>
             <a:fld id="{5DDB60B5-0831-44F0-B0BC-66D2EFC82116}" type="datetimeFigureOut">
               <a:rPr lang="en-US" smtClean="0"/>
-              <a:t>2/29/2016</a:t>
+              <a:t>3/8/2016</a:t>
             </a:fld>
             <a:endParaRPr lang="en-US"/>
           </a:p>
@@ -1619,7 +1619,7 @@
           <a:p>
             <a:fld id="{5DDB60B5-0831-44F0-B0BC-66D2EFC82116}" type="datetimeFigureOut">
               <a:rPr lang="en-US" smtClean="0"/>
-              <a:t>2/29/2016</a:t>
+              <a:t>3/8/2016</a:t>
             </a:fld>
             <a:endParaRPr lang="en-US"/>
           </a:p>
@@ -1737,7 +1737,7 @@
           <a:p>
             <a:fld id="{5DDB60B5-0831-44F0-B0BC-66D2EFC82116}" type="datetimeFigureOut">
               <a:rPr lang="en-US" smtClean="0"/>
-              <a:t>2/29/2016</a:t>
+              <a:t>3/8/2016</a:t>
             </a:fld>
             <a:endParaRPr lang="en-US"/>
           </a:p>
@@ -1832,7 +1832,7 @@
           <a:p>
             <a:fld id="{5DDB60B5-0831-44F0-B0BC-66D2EFC82116}" type="datetimeFigureOut">
               <a:rPr lang="en-US" smtClean="0"/>
-              <a:t>2/29/2016</a:t>
+              <a:t>3/8/2016</a:t>
             </a:fld>
             <a:endParaRPr lang="en-US"/>
           </a:p>
@@ -2109,7 +2109,7 @@
           <a:p>
             <a:fld id="{5DDB60B5-0831-44F0-B0BC-66D2EFC82116}" type="datetimeFigureOut">
               <a:rPr lang="en-US" smtClean="0"/>
-              <a:t>2/29/2016</a:t>
+              <a:t>3/8/2016</a:t>
             </a:fld>
             <a:endParaRPr lang="en-US"/>
           </a:p>
@@ -2362,7 +2362,7 @@
           <a:p>
             <a:fld id="{5DDB60B5-0831-44F0-B0BC-66D2EFC82116}" type="datetimeFigureOut">
               <a:rPr lang="en-US" smtClean="0"/>
-              <a:t>2/29/2016</a:t>
+              <a:t>3/8/2016</a:t>
             </a:fld>
             <a:endParaRPr lang="en-US"/>
           </a:p>
@@ -2575,7 +2575,7 @@
           <a:p>
             <a:fld id="{5DDB60B5-0831-44F0-B0BC-66D2EFC82116}" type="datetimeFigureOut">
               <a:rPr lang="en-US" smtClean="0"/>
-              <a:t>2/29/2016</a:t>
+              <a:t>3/8/2016</a:t>
             </a:fld>
             <a:endParaRPr lang="en-US"/>
           </a:p>
@@ -3073,7 +3073,11 @@
             </a:r>
             <a:r>
               <a:rPr lang="en-US" dirty="0" smtClean="0"/>
-              <a:t>2/29/16</a:t>
+              <a:t>3</a:t>
+            </a:r>
+            <a:r>
+              <a:rPr lang="en-US" dirty="0" smtClean="0"/>
+              <a:t>/8/16</a:t>
             </a:r>
             <a:endParaRPr lang="en-US" dirty="0"/>
           </a:p>
@@ -3173,11 +3177,7 @@
             </a:r>
             <a:r>
               <a:rPr lang="en-US" dirty="0" smtClean="0"/>
-              <a:t>1 </a:t>
-            </a:r>
-            <a:r>
-              <a:rPr lang="en-US" dirty="0" smtClean="0"/>
-              <a:t>day ~ Stretch goal</a:t>
+              <a:t>DONE</a:t>
             </a:r>
             <a:endParaRPr lang="en-US" dirty="0" smtClean="0"/>
           </a:p>
@@ -3187,8 +3187,13 @@
             </a:pPr>
             <a:r>
               <a:rPr lang="en-US" dirty="0"/>
-              <a:t>Priority: 6</a:t>
-            </a:r>
+              <a:t>Priority: </a:t>
+            </a:r>
+            <a:r>
+              <a:rPr lang="en-US" dirty="0" smtClean="0"/>
+              <a:t>DONE</a:t>
+            </a:r>
+            <a:endParaRPr lang="en-US" dirty="0"/>
           </a:p>
           <a:p>
             <a:pPr marL="0" indent="0">
@@ -3249,7 +3254,11 @@
             </a:r>
             <a:r>
               <a:rPr lang="en-US" dirty="0" smtClean="0"/>
-              <a:t>2/29/16</a:t>
+              <a:t>3</a:t>
+            </a:r>
+            <a:r>
+              <a:rPr lang="en-US" dirty="0" smtClean="0"/>
+              <a:t>/8/16</a:t>
             </a:r>
             <a:endParaRPr lang="en-US" dirty="0"/>
           </a:p>
@@ -3344,7 +3353,6 @@
               <a:rPr lang="en-US" dirty="0" smtClean="0"/>
               <a:t>Note***: We are keeping this as a stretch goal</a:t>
             </a:r>
-            <a:endParaRPr lang="en-US" dirty="0" smtClean="0"/>
           </a:p>
           <a:p>
             <a:pPr marL="0" indent="0">
@@ -3362,8 +3370,9 @@
             </a:r>
             <a:r>
               <a:rPr lang="en-US" dirty="0" smtClean="0"/>
-              <a:t>1 week/iteration ~ Stretch Goal</a:t>
-            </a:r>
+              <a:t>DONE</a:t>
+            </a:r>
+            <a:endParaRPr lang="en-US" dirty="0" smtClean="0"/>
           </a:p>
           <a:p>
             <a:pPr marL="0" indent="0">
@@ -3371,8 +3380,13 @@
             </a:pPr>
             <a:r>
               <a:rPr lang="en-US" dirty="0"/>
-              <a:t>Priority: 7</a:t>
-            </a:r>
+              <a:t>Priority: </a:t>
+            </a:r>
+            <a:r>
+              <a:rPr lang="en-US" dirty="0" smtClean="0"/>
+              <a:t>DONE</a:t>
+            </a:r>
+            <a:endParaRPr lang="en-US" dirty="0"/>
           </a:p>
           <a:p>
             <a:pPr marL="0" indent="0">
@@ -3439,7 +3453,11 @@
             </a:r>
             <a:r>
               <a:rPr lang="en-US" dirty="0" smtClean="0"/>
-              <a:t>2/29/16</a:t>
+              <a:t>3</a:t>
+            </a:r>
+            <a:r>
+              <a:rPr lang="en-US" dirty="0" smtClean="0"/>
+              <a:t>/8/16</a:t>
             </a:r>
             <a:endParaRPr lang="en-US" dirty="0"/>
           </a:p>
@@ -3513,6 +3531,10 @@
             <a:pPr marL="0" indent="0">
               <a:buNone/>
             </a:pPr>
+            <a:r>
+              <a:rPr lang="en-US" dirty="0" smtClean="0"/>
+              <a:t>Not Finished – Stretch Goal</a:t>
+            </a:r>
             <a:endParaRPr lang="en-US" dirty="0"/>
           </a:p>
           <a:p>
@@ -3531,11 +3553,7 @@
             </a:r>
             <a:r>
               <a:rPr lang="en-US" dirty="0" smtClean="0"/>
-              <a:t>1 </a:t>
-            </a:r>
-            <a:r>
-              <a:rPr lang="en-US" dirty="0" smtClean="0"/>
-              <a:t>weeks/iterations ~ Stretch Goal</a:t>
+              <a:t>1 weeks/iterations ~ Stretch Goal</a:t>
             </a:r>
           </a:p>
           <a:p>
@@ -3615,7 +3633,11 @@
             </a:r>
             <a:r>
               <a:rPr lang="en-US" dirty="0" smtClean="0"/>
-              <a:t>2/29/16</a:t>
+              <a:t>3</a:t>
+            </a:r>
+            <a:r>
+              <a:rPr lang="en-US" dirty="0" smtClean="0"/>
+              <a:t>/8/16</a:t>
             </a:r>
             <a:endParaRPr lang="en-US" dirty="0"/>
           </a:p>
@@ -3774,7 +3796,11 @@
             </a:r>
             <a:r>
               <a:rPr lang="en-US" dirty="0" smtClean="0"/>
-              <a:t>2/29/16</a:t>
+              <a:t>3</a:t>
+            </a:r>
+            <a:r>
+              <a:rPr lang="en-US" dirty="0" smtClean="0"/>
+              <a:t>/8/16</a:t>
             </a:r>
             <a:endParaRPr lang="en-US" dirty="0"/>
           </a:p>
@@ -3928,7 +3954,7 @@
             </a:r>
             <a:r>
               <a:rPr lang="en-US" dirty="0" smtClean="0"/>
-              <a:t>2/29/16</a:t>
+              <a:t>3/8/16</a:t>
             </a:r>
             <a:endParaRPr lang="en-US" dirty="0"/>
           </a:p>
@@ -4101,7 +4127,11 @@
             </a:r>
             <a:r>
               <a:rPr lang="en-US" dirty="0" smtClean="0"/>
-              <a:t>2/29/16</a:t>
+              <a:t>3</a:t>
+            </a:r>
+            <a:r>
+              <a:rPr lang="en-US" dirty="0" smtClean="0"/>
+              <a:t>/8/16</a:t>
             </a:r>
             <a:endParaRPr lang="en-US" dirty="0"/>
           </a:p>
@@ -4180,11 +4210,7 @@
             </a:pPr>
             <a:r>
               <a:rPr lang="en-US" dirty="0" smtClean="0"/>
-              <a:t>Est. Time: </a:t>
-            </a:r>
-            <a:r>
-              <a:rPr lang="en-US" dirty="0" smtClean="0"/>
-              <a:t>DONE</a:t>
+              <a:t>Est. Time: DONE</a:t>
             </a:r>
             <a:endParaRPr lang="en-US" dirty="0"/>
           </a:p>
@@ -4261,7 +4287,11 @@
             </a:r>
             <a:r>
               <a:rPr lang="en-US" dirty="0" smtClean="0"/>
-              <a:t>2/29/16</a:t>
+              <a:t>3</a:t>
+            </a:r>
+            <a:r>
+              <a:rPr lang="en-US" dirty="0" smtClean="0"/>
+              <a:t>/8/16</a:t>
             </a:r>
             <a:endParaRPr lang="en-US" dirty="0"/>
           </a:p>
@@ -4340,8 +4370,13 @@
             </a:pPr>
             <a:r>
               <a:rPr lang="en-US" dirty="0" smtClean="0"/>
-              <a:t>Est. Time: 1 week/iteration</a:t>
-            </a:r>
+              <a:t>Est. Time: </a:t>
+            </a:r>
+            <a:r>
+              <a:rPr lang="en-US" dirty="0" smtClean="0"/>
+              <a:t>DONE</a:t>
+            </a:r>
+            <a:endParaRPr lang="en-US" dirty="0" smtClean="0"/>
           </a:p>
           <a:p>
             <a:pPr marL="0" indent="0">
@@ -4349,8 +4384,13 @@
             </a:pPr>
             <a:r>
               <a:rPr lang="en-US" dirty="0"/>
-              <a:t>Priority: 2</a:t>
-            </a:r>
+              <a:t>Priority: </a:t>
+            </a:r>
+            <a:r>
+              <a:rPr lang="en-US" dirty="0" smtClean="0"/>
+              <a:t>DONE</a:t>
+            </a:r>
+            <a:endParaRPr lang="en-US" dirty="0"/>
           </a:p>
           <a:p>
             <a:pPr marL="0" indent="0">
@@ -4417,7 +4457,11 @@
             </a:r>
             <a:r>
               <a:rPr lang="en-US" dirty="0" smtClean="0"/>
-              <a:t>2/29/16</a:t>
+              <a:t>3</a:t>
+            </a:r>
+            <a:r>
+              <a:rPr lang="en-US" dirty="0" smtClean="0"/>
+              <a:t>/8/16</a:t>
             </a:r>
             <a:endParaRPr lang="en-US" dirty="0"/>
           </a:p>
@@ -4515,7 +4559,6 @@
               <a:rPr lang="en-US" dirty="0" smtClean="0"/>
               <a:t>DONE</a:t>
             </a:r>
-            <a:endParaRPr lang="en-US" dirty="0" smtClean="0"/>
           </a:p>
           <a:p>
             <a:pPr marL="0" indent="0">
@@ -4590,7 +4633,11 @@
             </a:r>
             <a:r>
               <a:rPr lang="en-US" dirty="0" smtClean="0"/>
-              <a:t>2/29/16</a:t>
+              <a:t>3</a:t>
+            </a:r>
+            <a:r>
+              <a:rPr lang="en-US" dirty="0" smtClean="0"/>
+              <a:t>/8/16</a:t>
             </a:r>
             <a:endParaRPr lang="en-US" dirty="0"/>
           </a:p>
@@ -4669,8 +4716,13 @@
             </a:pPr>
             <a:r>
               <a:rPr lang="en-US" dirty="0" smtClean="0"/>
-              <a:t>Est. Time: 1 day</a:t>
-            </a:r>
+              <a:t>Est. Time: </a:t>
+            </a:r>
+            <a:r>
+              <a:rPr lang="en-US" dirty="0" smtClean="0"/>
+              <a:t>DONE</a:t>
+            </a:r>
+            <a:endParaRPr lang="en-US" dirty="0" smtClean="0"/>
           </a:p>
           <a:p>
             <a:pPr marL="0" indent="0">
@@ -4682,7 +4734,7 @@
             </a:r>
             <a:r>
               <a:rPr lang="en-US" dirty="0" smtClean="0"/>
-              <a:t>4</a:t>
+              <a:t>DONE</a:t>
             </a:r>
             <a:endParaRPr lang="en-US" dirty="0"/>
           </a:p>
@@ -4751,7 +4803,11 @@
             </a:r>
             <a:r>
               <a:rPr lang="en-US" dirty="0" smtClean="0"/>
-              <a:t>2/29/16</a:t>
+              <a:t>3</a:t>
+            </a:r>
+            <a:r>
+              <a:rPr lang="en-US" dirty="0" smtClean="0"/>
+              <a:t>/8/16</a:t>
             </a:r>
             <a:endParaRPr lang="en-US" dirty="0"/>
           </a:p>
@@ -4770,7 +4826,7 @@
         <p:spPr/>
         <p:txBody>
           <a:bodyPr>
-            <a:normAutofit lnSpcReduction="10000"/>
+            <a:normAutofit/>
           </a:bodyPr>
           <a:lstStyle/>
           <a:p>
@@ -4834,25 +4890,15 @@
             </a:pPr>
             <a:r>
               <a:rPr lang="en-US" dirty="0" smtClean="0"/>
-              <a:t>(Almost done)</a:t>
-            </a:r>
-            <a:endParaRPr lang="en-US" dirty="0"/>
-          </a:p>
-          <a:p>
-            <a:pPr marL="0" indent="0">
-              <a:buNone/>
-            </a:pPr>
+              <a:t>Est</a:t>
+            </a:r>
             <a:r>
               <a:rPr lang="en-US" dirty="0"/>
-              <a:t>Est. Time: </a:t>
-            </a:r>
-            <a:r>
-              <a:rPr lang="en-US" dirty="0" smtClean="0"/>
-              <a:t>1 </a:t>
-            </a:r>
-            <a:r>
-              <a:rPr lang="en-US" dirty="0" smtClean="0"/>
-              <a:t>week</a:t>
+              <a:t>. Time: </a:t>
+            </a:r>
+            <a:r>
+              <a:rPr lang="en-US" dirty="0" smtClean="0"/>
+              <a:t>DONE</a:t>
             </a:r>
             <a:endParaRPr lang="en-US" dirty="0"/>
           </a:p>
@@ -4870,7 +4916,7 @@
             </a:r>
             <a:r>
               <a:rPr lang="en-US" dirty="0" smtClean="0"/>
-              <a:t>5</a:t>
+              <a:t>DONE</a:t>
             </a:r>
             <a:endParaRPr lang="en-US" dirty="0"/>
           </a:p>

</xml_diff>